<commit_message>
RMS [ 2023. 01. 04 ] 1차 배포 버전
</commit_message>
<xml_diff>
--- a/src/main/webapp/WEB-INF/Files/erp_sample.pptx
+++ b/src/main/webapp/WEB-INF/Files/erp_sample.pptx
@@ -84,7 +84,7 @@
       </p:grpSpPr>
       <p:sp>
         <p:nvSpPr>
-          <p:cNvPr id="930043057" name="Text">
+          <p:cNvPr id="1642278806" name="Text">
     </p:cNvPr>
           <p:cNvSpPr>
             <a:spLocks noGrp="1"/>
@@ -130,7 +130,7 @@
       </p:sp>
       <p:sp>
         <p:nvSpPr>
-          <p:cNvPr id="374545106" name="Text">
+          <p:cNvPr id="1595349196" name="Text">
     </p:cNvPr>
           <p:cNvSpPr>
             <a:spLocks noGrp="1"/>
@@ -179,7 +179,7 @@
       </p:sp>
       <p:sp>
         <p:nvSpPr>
-          <p:cNvPr id="1195657349" name="Text">
+          <p:cNvPr id="1946072128" name="Text">
     </p:cNvPr>
           <p:cNvSpPr>
             <a:spLocks noGrp="1"/>
@@ -228,7 +228,7 @@
       </p:sp>
       <p:sp>
         <p:nvSpPr>
-          <p:cNvPr id="185508559" name="Line"/>
+          <p:cNvPr id="622607232" name="Line"/>
           <p:cNvSpPr>
             <a:spLocks noGrp="1"/>
           </p:cNvSpPr>
@@ -262,7 +262,7 @@
       </p:sp>
       <p:sp>
         <p:nvSpPr>
-          <p:cNvPr id="1175037379" name="Text">
+          <p:cNvPr id="1538870085" name="Text">
     </p:cNvPr>
           <p:cNvSpPr>
             <a:spLocks noGrp="1"/>
@@ -326,7 +326,7 @@
       </p:sp>
       <p:sp>
         <p:nvSpPr>
-          <p:cNvPr id="1216520794" name="Text">
+          <p:cNvPr id="1007679878" name="Text">
     </p:cNvPr>
           <p:cNvSpPr>
             <a:spLocks noGrp="1"/>
@@ -381,7 +381,7 @@
       </p:sp>
       <p:sp>
         <p:nvSpPr>
-          <p:cNvPr id="761777071" name="Text">
+          <p:cNvPr id="978650867" name="Text">
     </p:cNvPr>
           <p:cNvSpPr>
             <a:spLocks noGrp="1"/>
@@ -436,7 +436,7 @@
       </p:sp>
       <p:sp>
         <p:nvSpPr>
-          <p:cNvPr id="1400970262" name="Text">
+          <p:cNvPr id="2127686146" name="Text">
     </p:cNvPr>
           <p:cNvSpPr>
             <a:spLocks noGrp="1"/>
@@ -500,7 +500,7 @@
       </p:sp>
       <p:sp>
         <p:nvSpPr>
-          <p:cNvPr id="1487768600" name="Text">
+          <p:cNvPr id="1864594942" name="Text">
     </p:cNvPr>
           <p:cNvSpPr>
             <a:spLocks noGrp="1"/>
@@ -564,7 +564,7 @@
       </p:sp>
       <p:sp>
         <p:nvSpPr>
-          <p:cNvPr id="90203429" name="Text">
+          <p:cNvPr id="1336141710" name="Text">
     </p:cNvPr>
           <p:cNvSpPr>
             <a:spLocks noGrp="1"/>
@@ -619,7 +619,7 @@
       </p:sp>
       <p:sp>
         <p:nvSpPr>
-          <p:cNvPr id="382332053" name="Text">
+          <p:cNvPr id="1004267265" name="Text">
     </p:cNvPr>
           <p:cNvSpPr>
             <a:spLocks noGrp="1"/>
@@ -674,7 +674,7 @@
       </p:sp>
       <p:sp>
         <p:nvSpPr>
-          <p:cNvPr id="1307784182" name="Text">
+          <p:cNvPr id="215813093" name="Text">
     </p:cNvPr>
           <p:cNvSpPr>
             <a:spLocks noGrp="1"/>
@@ -738,7 +738,7 @@
       </p:sp>
       <p:sp>
         <p:nvSpPr>
-          <p:cNvPr id="2030742300" name="Text">
+          <p:cNvPr id="787607481" name="Text">
     </p:cNvPr>
           <p:cNvSpPr>
             <a:spLocks noGrp="1"/>
@@ -802,7 +802,7 @@
       </p:sp>
       <p:sp>
         <p:nvSpPr>
-          <p:cNvPr id="2135273557" name="Text">
+          <p:cNvPr id="2118050430" name="Text">
     </p:cNvPr>
           <p:cNvSpPr>
             <a:spLocks noGrp="1"/>
@@ -891,7 +891,7 @@
       </p:sp>
       <p:sp>
         <p:nvSpPr>
-          <p:cNvPr id="640763500" name="Text">
+          <p:cNvPr id="448389463" name="Text">
     </p:cNvPr>
           <p:cNvSpPr>
             <a:spLocks noGrp="1"/>
@@ -981,7 +981,7 @@
       </p:sp>
       <p:sp>
         <p:nvSpPr>
-          <p:cNvPr id="1913236959" name="Text">
+          <p:cNvPr id="2120172486" name="Text">
     </p:cNvPr>
           <p:cNvSpPr>
             <a:spLocks noGrp="1"/>
@@ -1070,7 +1070,7 @@
       </p:sp>
       <p:sp>
         <p:nvSpPr>
-          <p:cNvPr id="1593293513" name="Text">
+          <p:cNvPr id="1601365907" name="Text">
     </p:cNvPr>
           <p:cNvSpPr>
             <a:spLocks noGrp="1"/>
@@ -1132,7 +1132,7 @@
       </p:sp>
       <p:sp>
         <p:nvSpPr>
-          <p:cNvPr id="216170074" name="Text">
+          <p:cNvPr id="1456915217" name="Text">
     </p:cNvPr>
           <p:cNvSpPr>
             <a:spLocks noGrp="1"/>
@@ -1194,7 +1194,7 @@
       </p:sp>
       <p:sp>
         <p:nvSpPr>
-          <p:cNvPr id="541875084" name="Text">
+          <p:cNvPr id="61875141" name="Text">
     </p:cNvPr>
           <p:cNvSpPr>
             <a:spLocks noGrp="1"/>
@@ -1400,7 +1400,7 @@
       </p:sp>
       <p:sp>
         <p:nvSpPr>
-          <p:cNvPr id="521436431" name="Text">
+          <p:cNvPr id="125108486" name="Text">
     </p:cNvPr>
           <p:cNvSpPr>
             <a:spLocks noGrp="1"/>
@@ -1581,7 +1581,7 @@
       </p:sp>
       <p:sp>
         <p:nvSpPr>
-          <p:cNvPr id="2086059478" name="Text">
+          <p:cNvPr id="1332948996" name="Text">
     </p:cNvPr>
           <p:cNvSpPr>
             <a:spLocks noGrp="1"/>
@@ -1762,7 +1762,7 @@
       </p:sp>
       <p:sp>
         <p:nvSpPr>
-          <p:cNvPr id="1666784424" name="Text">
+          <p:cNvPr id="794672304" name="Text">
     </p:cNvPr>
           <p:cNvSpPr>
             <a:spLocks noGrp="1"/>
@@ -1943,7 +1943,644 @@
       </p:sp>
       <p:sp>
         <p:nvSpPr>
-          <p:cNvPr id="554412916" name="Text">
+          <p:cNvPr id="770772117" name="Text">
+    </p:cNvPr>
+          <p:cNvSpPr>
+            <a:spLocks noGrp="1"/>
+          </p:cNvSpPr>
+          <p:nvPr/>
+        </p:nvSpPr>
+        <p:spPr>
+          <a:xfrm rot="0">
+            <a:off x="9829800" y="4610100"/>
+            <a:ext cx="635000" cy="1524000"/>
+          </a:xfrm>
+          <a:prstGeom prst="rect">
+            <a:avLst/>
+          </a:prstGeom>
+          <a:ln w="12700">
+            <a:solidFill>
+              <a:srgbClr val="000000"/>
+            </a:solidFill>
+            <a:prstDash val="solid"/>
+          </a:ln>
+        </p:spPr>
+        <p:txBody>
+          <a:bodyPr wrap="square" lIns="0" tIns="0" rIns="0" bIns="0" rtlCol="0" anchor="t"/>
+          <a:lstStyle/>
+          <a:p>
+            <a:pPr algn="ctr">
+              <a:lnSpc>
+                <a:spcPct val="100%"/>
+              </a:lnSpc>
+              <a:defRPr sz="900">
+                <a:solidFill>
+                  <a:srgbClr val="000000"/>
+                </a:solidFill>
+                <a:latin typeface="맑은 고딕"/>
+                <a:ea typeface="맑은 고딕"/>
+                <a:cs typeface="맑은 고딕"/>
+              </a:defRPr>
+            </a:pPr>
+            <a:br/>
+            <a:r>
+              <a:rPr lang="ko" sz="900">
+                <a:latin typeface="맑은 고딕"/>
+                <a:ea typeface="맑은 고딕"/>
+                <a:cs typeface="맑은 고딕"/>
+              </a:rPr>
+              <a:t>12/22</a:t>
+            </a:r>
+            <a:br/>
+            <a:r>
+              <a:rPr lang="ko" sz="900">
+                <a:latin typeface="맑은 고딕"/>
+                <a:ea typeface="맑은 고딕"/>
+                <a:cs typeface="맑은 고딕"/>
+              </a:rPr>
+              <a:t>[보류]</a:t>
+            </a:r>
+            <a:br/>
+          </a:p>
+        </p:txBody>
+      </p:sp>
+      <p:sp>
+        <p:nvSpPr>
+          <p:cNvPr id="35869980" name="Text">
+    </p:cNvPr>
+          <p:cNvSpPr>
+            <a:spLocks noGrp="1"/>
+          </p:cNvSpPr>
+          <p:nvPr/>
+        </p:nvSpPr>
+        <p:spPr>
+          <a:xfrm rot="0">
+            <a:off x="9194800" y="4610100"/>
+            <a:ext cx="635000" cy="1524000"/>
+          </a:xfrm>
+          <a:prstGeom prst="rect">
+            <a:avLst/>
+          </a:prstGeom>
+          <a:ln w="12700">
+            <a:solidFill>
+              <a:srgbClr val="000000"/>
+            </a:solidFill>
+            <a:prstDash val="solid"/>
+          </a:ln>
+        </p:spPr>
+        <p:txBody>
+          <a:bodyPr wrap="square" lIns="0" tIns="0" rIns="0" bIns="0" rtlCol="0" anchor="t"/>
+          <a:lstStyle/>
+          <a:p>
+            <a:pPr algn="ctr">
+              <a:lnSpc>
+                <a:spcPct val="100%"/>
+              </a:lnSpc>
+              <a:defRPr sz="900">
+                <a:solidFill>
+                  <a:srgbClr val="000000"/>
+                </a:solidFill>
+                <a:latin typeface="맑은 고딕"/>
+                <a:ea typeface="맑은 고딕"/>
+                <a:cs typeface="맑은 고딕"/>
+              </a:defRPr>
+            </a:pPr>
+            <a:br/>
+            <a:r>
+              <a:rPr lang="ko" sz="900">
+                <a:latin typeface="맑은 고딕"/>
+                <a:ea typeface="맑은 고딕"/>
+                <a:cs typeface="맑은 고딕"/>
+              </a:rPr>
+              <a:t>12/28</a:t>
+            </a:r>
+            <a:br/>
+            <a:r>
+              <a:rPr lang="ko" sz="900">
+                <a:latin typeface="맑은 고딕"/>
+                <a:ea typeface="맑은 고딕"/>
+                <a:cs typeface="맑은 고딕"/>
+              </a:rPr>
+              <a:t>12/28</a:t>
+            </a:r>
+            <a:br/>
+          </a:p>
+        </p:txBody>
+      </p:sp>
+      <p:sp>
+        <p:nvSpPr>
+          <p:cNvPr id="1409726028" name="Text">
+    </p:cNvPr>
+          <p:cNvSpPr>
+            <a:spLocks noGrp="1"/>
+          </p:cNvSpPr>
+          <p:nvPr/>
+        </p:nvSpPr>
+        <p:spPr>
+          <a:xfrm rot="0">
+            <a:off x="6350000" y="4610100"/>
+            <a:ext cx="2844800" cy="1524000"/>
+          </a:xfrm>
+          <a:prstGeom prst="rect">
+            <a:avLst/>
+          </a:prstGeom>
+          <a:ln w="12700">
+            <a:solidFill>
+              <a:srgbClr val="000000"/>
+            </a:solidFill>
+            <a:prstDash val="solid"/>
+          </a:ln>
+        </p:spPr>
+        <p:txBody>
+          <a:bodyPr wrap="square" lIns="0" tIns="0" rIns="0" bIns="0" rtlCol="0" anchor="t"/>
+          <a:lstStyle/>
+          <a:p>
+            <a:pPr algn="l">
+              <a:lnSpc>
+                <a:spcPct val="100%"/>
+              </a:lnSpc>
+              <a:defRPr sz="900">
+                <a:solidFill>
+                  <a:srgbClr val="000000"/>
+                </a:solidFill>
+                <a:latin typeface="맑은 고딕"/>
+                <a:ea typeface="맑은 고딕"/>
+                <a:cs typeface="맑은 고딕"/>
+              </a:defRPr>
+            </a:pPr>
+            <a:br/>
+            <a:r>
+              <a:rPr lang="ko" sz="900">
+                <a:latin typeface="맑은 고딕"/>
+                <a:ea typeface="맑은 고딕"/>
+                <a:cs typeface="맑은 고딕"/>
+              </a:rPr>
+              <a:t>- [E-BIZ] 거래처 정보화면 임원 별도처리</a:t>
+            </a:r>
+            <a:br/>
+            <a:r>
+              <a:rPr lang="ko" sz="900">
+                <a:latin typeface="맑은 고딕"/>
+                <a:ea typeface="맑은 고딕"/>
+                <a:cs typeface="맑은 고딕"/>
+              </a:rPr>
+              <a:t>- [ERP] 운영 ERP 사용자 정보 동기화</a:t>
+            </a:r>
+            <a:br/>
+          </a:p>
+        </p:txBody>
+      </p:sp>
+      <p:sp>
+        <p:nvSpPr>
+          <p:cNvPr id="385624128" name="Text">
+    </p:cNvPr>
+          <p:cNvSpPr>
+            <a:spLocks noGrp="1"/>
+          </p:cNvSpPr>
+          <p:nvPr/>
+        </p:nvSpPr>
+        <p:spPr>
+          <a:xfrm rot="0">
+            <a:off x="5753100" y="4610100"/>
+            <a:ext cx="596900" cy="1524000"/>
+          </a:xfrm>
+          <a:prstGeom prst="rect">
+            <a:avLst/>
+          </a:prstGeom>
+          <a:ln w="12700">
+            <a:solidFill>
+              <a:srgbClr val="000000"/>
+            </a:solidFill>
+            <a:prstDash val="solid"/>
+          </a:ln>
+        </p:spPr>
+        <p:txBody>
+          <a:bodyPr wrap="square" lIns="0" tIns="0" rIns="0" bIns="0" rtlCol="0" anchor="t"/>
+          <a:lstStyle/>
+          <a:p>
+            <a:pPr algn="ctr">
+              <a:lnSpc>
+                <a:spcPct val="100%"/>
+              </a:lnSpc>
+              <a:defRPr sz="900">
+                <a:solidFill>
+                  <a:srgbClr val="000000"/>
+                </a:solidFill>
+                <a:latin typeface="맑은 고딕"/>
+                <a:ea typeface="맑은 고딕"/>
+                <a:cs typeface="맑은 고딕"/>
+              </a:defRPr>
+            </a:pPr>
+            <a:br/>
+            <a:r>
+              <a:rPr lang="ko" sz="900">
+                <a:latin typeface="맑은 고딕"/>
+                <a:ea typeface="맑은 고딕"/>
+                <a:cs typeface="맑은 고딕"/>
+              </a:rPr>
+              <a:t>e-Biz</a:t>
+            </a:r>
+            <a:br/>
+            <a:r>
+              <a:rPr lang="ko" sz="900">
+                <a:latin typeface="맑은 고딕"/>
+                <a:ea typeface="맑은 고딕"/>
+                <a:cs typeface="맑은 고딕"/>
+              </a:rPr>
+              <a:t>/계정관리</a:t>
+            </a:r>
+            <a:br/>
+            <a:r>
+              <a:rPr lang="ko" sz="900">
+                <a:latin typeface="맑은 고딕"/>
+                <a:ea typeface="맑은 고딕"/>
+                <a:cs typeface="맑은 고딕"/>
+              </a:rPr>
+              <a:t>/FLBIZ</a:t>
+            </a:r>
+            <a:br/>
+            <a:r>
+              <a:rPr lang="ko" sz="900">
+                <a:latin typeface="맑은 고딕"/>
+                <a:ea typeface="맑은 고딕"/>
+                <a:cs typeface="맑은 고딕"/>
+              </a:rPr>
+              <a:t>이여진</a:t>
+            </a:r>
+          </a:p>
+        </p:txBody>
+      </p:sp>
+      <p:sp>
+        <p:nvSpPr>
+          <p:cNvPr id="860621742" name="Text">
+    </p:cNvPr>
+          <p:cNvSpPr>
+            <a:spLocks noGrp="1"/>
+          </p:cNvSpPr>
+          <p:nvPr/>
+        </p:nvSpPr>
+        <p:spPr>
+          <a:xfrm rot="0">
+            <a:off x="177800" y="4610100"/>
+            <a:ext cx="571500" cy="1524000"/>
+          </a:xfrm>
+          <a:prstGeom prst="rect">
+            <a:avLst/>
+          </a:prstGeom>
+          <a:ln w="12700">
+            <a:solidFill>
+              <a:srgbClr val="000000"/>
+            </a:solidFill>
+            <a:prstDash val="solid"/>
+          </a:ln>
+        </p:spPr>
+        <p:txBody>
+          <a:bodyPr wrap="square" lIns="0" tIns="0" rIns="0" bIns="0" rtlCol="0" anchor="t"/>
+          <a:lstStyle/>
+          <a:p>
+            <a:pPr algn="ctr">
+              <a:lnSpc>
+                <a:spcPct val="100%"/>
+              </a:lnSpc>
+              <a:defRPr sz="900">
+                <a:solidFill>
+                  <a:srgbClr val="000000"/>
+                </a:solidFill>
+                <a:latin typeface="맑은 고딕"/>
+                <a:ea typeface="맑은 고딕"/>
+                <a:cs typeface="맑은 고딕"/>
+              </a:defRPr>
+            </a:pPr>
+            <a:br/>
+            <a:r>
+              <a:rPr lang="ko" sz="900">
+                <a:latin typeface="맑은 고딕"/>
+                <a:ea typeface="맑은 고딕"/>
+                <a:cs typeface="맑은 고딕"/>
+              </a:rPr>
+              <a:t>e-Biz</a:t>
+            </a:r>
+            <a:br/>
+            <a:r>
+              <a:rPr lang="ko" sz="900">
+                <a:latin typeface="맑은 고딕"/>
+                <a:ea typeface="맑은 고딕"/>
+                <a:cs typeface="맑은 고딕"/>
+              </a:rPr>
+              <a:t>/계정관리</a:t>
+            </a:r>
+            <a:br/>
+            <a:r>
+              <a:rPr lang="ko" sz="900">
+                <a:latin typeface="맑은 고딕"/>
+                <a:ea typeface="맑은 고딕"/>
+                <a:cs typeface="맑은 고딕"/>
+              </a:rPr>
+              <a:t>/FLBIZ</a:t>
+            </a:r>
+            <a:br/>
+            <a:r>
+              <a:rPr lang="ko" sz="900">
+                <a:latin typeface="맑은 고딕"/>
+                <a:ea typeface="맑은 고딕"/>
+                <a:cs typeface="맑은 고딕"/>
+              </a:rPr>
+              <a:t>이여진</a:t>
+            </a:r>
+          </a:p>
+        </p:txBody>
+      </p:sp>
+      <p:sp>
+        <p:nvSpPr>
+          <p:cNvPr id="736043886" name="Text">
+    </p:cNvPr>
+          <p:cNvSpPr>
+            <a:spLocks noGrp="1"/>
+          </p:cNvSpPr>
+          <p:nvPr/>
+        </p:nvSpPr>
+        <p:spPr>
+          <a:xfrm rot="0">
+            <a:off x="749300" y="4610100"/>
+            <a:ext cx="3035300" cy="1524000"/>
+          </a:xfrm>
+          <a:prstGeom prst="rect">
+            <a:avLst/>
+          </a:prstGeom>
+          <a:ln w="12700">
+            <a:solidFill>
+              <a:srgbClr val="000000"/>
+            </a:solidFill>
+            <a:prstDash val="solid"/>
+          </a:ln>
+        </p:spPr>
+        <p:txBody>
+          <a:bodyPr wrap="square" lIns="0" tIns="0" rIns="0" bIns="0" rtlCol="0" anchor="t"/>
+          <a:lstStyle/>
+          <a:p>
+            <a:pPr algn="l">
+              <a:lnSpc>
+                <a:spcPct val="100%"/>
+              </a:lnSpc>
+              <a:defRPr sz="900">
+                <a:solidFill>
+                  <a:srgbClr val="000000"/>
+                </a:solidFill>
+                <a:latin typeface="맑은 고딕"/>
+                <a:ea typeface="맑은 고딕"/>
+                <a:cs typeface="맑은 고딕"/>
+              </a:defRPr>
+            </a:pPr>
+            <a:br/>
+            <a:r>
+              <a:rPr lang="ko" sz="900">
+                <a:latin typeface="맑은 고딕"/>
+                <a:ea typeface="맑은 고딕"/>
+                <a:cs typeface="맑은 고딕"/>
+              </a:rPr>
+              <a:t>- [E-BIZ] e-Biz 거래처 정보화면 개선</a:t>
+            </a:r>
+            <a:br/>
+            <a:r>
+              <a:rPr lang="ko" sz="900">
+                <a:latin typeface="맑은 고딕"/>
+                <a:ea typeface="맑은 고딕"/>
+                <a:cs typeface="맑은 고딕"/>
+              </a:rPr>
+              <a:t>- [E-BIZ] 사후적립 통제기준 변경</a:t>
+            </a:r>
+            <a:br/>
+            <a:r>
+              <a:rPr lang="ko" sz="900">
+                <a:latin typeface="맑은 고딕"/>
+                <a:ea typeface="맑은 고딕"/>
+                <a:cs typeface="맑은 고딕"/>
+              </a:rPr>
+              <a:t>- [E-BIZ] 납품보류 해제요청 기능 추가</a:t>
+            </a:r>
+            <a:br/>
+          </a:p>
+        </p:txBody>
+      </p:sp>
+      <p:sp>
+        <p:nvSpPr>
+          <p:cNvPr id="1250579599" name="Text">
+    </p:cNvPr>
+          <p:cNvSpPr>
+            <a:spLocks noGrp="1"/>
+          </p:cNvSpPr>
+          <p:nvPr/>
+        </p:nvSpPr>
+        <p:spPr>
+          <a:xfrm rot="0">
+            <a:off x="4419600" y="4610100"/>
+            <a:ext cx="635000" cy="1524000"/>
+          </a:xfrm>
+          <a:prstGeom prst="rect">
+            <a:avLst/>
+          </a:prstGeom>
+          <a:ln w="12700">
+            <a:solidFill>
+              <a:srgbClr val="000000"/>
+            </a:solidFill>
+            <a:prstDash val="solid"/>
+          </a:ln>
+        </p:spPr>
+        <p:txBody>
+          <a:bodyPr wrap="square" lIns="0" tIns="0" rIns="0" bIns="0" rtlCol="0" anchor="t"/>
+          <a:lstStyle/>
+          <a:p>
+            <a:pPr algn="ctr">
+              <a:lnSpc>
+                <a:spcPct val="100%"/>
+              </a:lnSpc>
+              <a:defRPr sz="900">
+                <a:solidFill>
+                  <a:srgbClr val="000000"/>
+                </a:solidFill>
+                <a:latin typeface="맑은 고딕"/>
+                <a:ea typeface="맑은 고딕"/>
+                <a:cs typeface="맑은 고딕"/>
+              </a:defRPr>
+            </a:pPr>
+            <a:br/>
+            <a:r>
+              <a:rPr lang="ko" sz="900">
+                <a:latin typeface="맑은 고딕"/>
+                <a:ea typeface="맑은 고딕"/>
+                <a:cs typeface="맑은 고딕"/>
+              </a:rPr>
+              <a:t>12/16</a:t>
+            </a:r>
+            <a:br/>
+            <a:r>
+              <a:rPr lang="ko" sz="900">
+                <a:latin typeface="맑은 고딕"/>
+                <a:ea typeface="맑은 고딕"/>
+                <a:cs typeface="맑은 고딕"/>
+              </a:rPr>
+              <a:t>12/22</a:t>
+            </a:r>
+            <a:br/>
+            <a:r>
+              <a:rPr lang="ko" sz="900">
+                <a:latin typeface="맑은 고딕"/>
+                <a:ea typeface="맑은 고딕"/>
+                <a:cs typeface="맑은 고딕"/>
+              </a:rPr>
+              <a:t>[보류]</a:t>
+            </a:r>
+            <a:br/>
+          </a:p>
+        </p:txBody>
+      </p:sp>
+      <p:sp>
+        <p:nvSpPr>
+          <p:cNvPr id="1027853238" name="Text">
+    </p:cNvPr>
+          <p:cNvSpPr>
+            <a:spLocks noGrp="1"/>
+          </p:cNvSpPr>
+          <p:nvPr/>
+        </p:nvSpPr>
+        <p:spPr>
+          <a:xfrm rot="0">
+            <a:off x="5054600" y="4610100"/>
+            <a:ext cx="635000" cy="1524000"/>
+          </a:xfrm>
+          <a:prstGeom prst="rect">
+            <a:avLst/>
+          </a:prstGeom>
+          <a:ln w="12700">
+            <a:solidFill>
+              <a:srgbClr val="000000"/>
+            </a:solidFill>
+            <a:prstDash val="solid"/>
+          </a:ln>
+        </p:spPr>
+        <p:txBody>
+          <a:bodyPr wrap="square" lIns="0" tIns="0" rIns="0" bIns="0" rtlCol="0" anchor="t"/>
+          <a:lstStyle/>
+          <a:p>
+            <a:pPr algn="ctr">
+              <a:lnSpc>
+                <a:spcPct val="100%"/>
+              </a:lnSpc>
+              <a:defRPr sz="900">
+                <a:solidFill>
+                  <a:srgbClr val="000000"/>
+                </a:solidFill>
+                <a:latin typeface="맑은 고딕"/>
+                <a:ea typeface="맑은 고딕"/>
+                <a:cs typeface="맑은 고딕"/>
+              </a:defRPr>
+            </a:pPr>
+            <a:br/>
+            <a:r>
+              <a:rPr lang="ko" sz="900">
+                <a:latin typeface="맑은 고딕"/>
+                <a:ea typeface="맑은 고딕"/>
+                <a:cs typeface="맑은 고딕"/>
+              </a:rPr>
+              <a:t>12/02</a:t>
+            </a:r>
+            <a:br/>
+            <a:r>
+              <a:rPr lang="ko" sz="900">
+                <a:latin typeface="맑은 고딕"/>
+                <a:ea typeface="맑은 고딕"/>
+                <a:cs typeface="맑은 고딕"/>
+              </a:rPr>
+              <a:t>12/13</a:t>
+            </a:r>
+            <a:br/>
+            <a:r>
+              <a:rPr lang="ko" sz="900">
+                <a:latin typeface="맑은 고딕"/>
+                <a:ea typeface="맑은 고딕"/>
+                <a:cs typeface="맑은 고딕"/>
+              </a:rPr>
+              <a:t>[보류]</a:t>
+            </a:r>
+            <a:br/>
+          </a:p>
+        </p:txBody>
+      </p:sp>
+      <p:sp>
+        <p:nvSpPr>
+          <p:cNvPr id="1853990603" name="Text">
+    </p:cNvPr>
+          <p:cNvSpPr>
+            <a:spLocks noGrp="1"/>
+          </p:cNvSpPr>
+          <p:nvPr/>
+        </p:nvSpPr>
+        <p:spPr>
+          <a:xfrm rot="0">
+            <a:off x="3784600" y="4610100"/>
+            <a:ext cx="635000" cy="1524000"/>
+          </a:xfrm>
+          <a:prstGeom prst="rect">
+            <a:avLst/>
+          </a:prstGeom>
+          <a:ln w="12700">
+            <a:solidFill>
+              <a:srgbClr val="000000"/>
+            </a:solidFill>
+            <a:prstDash val="solid"/>
+          </a:ln>
+        </p:spPr>
+        <p:txBody>
+          <a:bodyPr wrap="square" lIns="0" tIns="0" rIns="0" bIns="0" rtlCol="0" anchor="t"/>
+          <a:lstStyle/>
+          <a:p>
+            <a:pPr algn="ctr">
+              <a:lnSpc>
+                <a:spcPct val="100%"/>
+              </a:lnSpc>
+              <a:defRPr sz="900">
+                <a:solidFill>
+                  <a:srgbClr val="000000"/>
+                </a:solidFill>
+                <a:latin typeface="맑은 고딕"/>
+                <a:ea typeface="맑은 고딕"/>
+                <a:cs typeface="맑은 고딕"/>
+              </a:defRPr>
+            </a:pPr>
+            <a:br/>
+            <a:r>
+              <a:rPr lang="ko" sz="900">
+                <a:latin typeface="맑은 고딕"/>
+                <a:ea typeface="맑은 고딕"/>
+                <a:cs typeface="맑은 고딕"/>
+              </a:rPr>
+              <a:t>12/28</a:t>
+            </a:r>
+            <a:br/>
+            <a:r>
+              <a:rPr lang="ko" sz="900">
+                <a:latin typeface="맑은 고딕"/>
+                <a:ea typeface="맑은 고딕"/>
+                <a:cs typeface="맑은 고딕"/>
+              </a:rPr>
+              <a:t>12/28</a:t>
+            </a:r>
+            <a:br/>
+            <a:r>
+              <a:rPr lang="ko" sz="900">
+                <a:latin typeface="맑은 고딕"/>
+                <a:ea typeface="맑은 고딕"/>
+                <a:cs typeface="맑은 고딕"/>
+              </a:rPr>
+              <a:t>12/28</a:t>
+            </a:r>
+            <a:br/>
+          </a:p>
+        </p:txBody>
+      </p:sp>
+      <p:sp>
+        <p:nvSpPr>
+          <p:cNvPr id="1008151590" name="Text">
     </p:cNvPr>
           <p:cNvSpPr>
             <a:spLocks noGrp="1"/>
@@ -1989,7 +2626,7 @@
       </p:sp>
       <p:pic>
         <p:nvPicPr>
-          <p:cNvPr id="58810052" name="Picture">
+          <p:cNvPr id="737727781" name="Picture">
     </p:cNvPr>
           <p:cNvPicPr>
             <a:picLocks noChangeAspect="1"/>
@@ -1997,7 +2634,7 @@
           <p:nvPr/>
         </p:nvPicPr>
         <p:blipFill>
-          <a:blip r:embed="img_0_0_23.jpg"/>
+          <a:blip r:embed="img_0_0_32.jpg"/>
           <a:srcRect/>
           <a:stretch>
             <a:fillRect l="0" t="0" r="0" b="5555"/>

</xml_diff>